<commit_message>
Added Group and mods
</commit_message>
<xml_diff>
--- a/CheatSheet/ppt/CheatSheet.pptx
+++ b/CheatSheet/ppt/CheatSheet.pptx
@@ -4,6 +4,9 @@
   <p:sldMasterIdLst>
     <p:sldMasterId id="2147483783" r:id="rId1"/>
   </p:sldMasterIdLst>
+  <p:notesMasterIdLst>
+    <p:notesMasterId r:id="rId4"/>
+  </p:notesMasterIdLst>
   <p:sldIdLst>
     <p:sldId id="256" r:id="rId2"/>
     <p:sldId id="257" r:id="rId3"/>
@@ -106,6 +109,439 @@
     </a:lvl9pPr>
   </p:defaultTextStyle>
 </p:presentation>
+</file>
+
+<file path=ppt/notesMasters/notesMaster1.xml><?xml version="1.0" encoding="utf-8"?>
+<p:notesMaster xmlns:a="http://schemas.openxmlformats.org/drawingml/2006/main" xmlns:r="http://schemas.openxmlformats.org/officeDocument/2006/relationships" xmlns:p="http://schemas.openxmlformats.org/presentationml/2006/main">
+  <p:cSld>
+    <p:bg>
+      <p:bgRef idx="1001">
+        <a:schemeClr val="bg1"/>
+      </p:bgRef>
+    </p:bg>
+    <p:spTree>
+      <p:nvGrpSpPr>
+        <p:cNvPr id="1" name=""/>
+        <p:cNvGrpSpPr/>
+        <p:nvPr/>
+      </p:nvGrpSpPr>
+      <p:grpSpPr>
+        <a:xfrm>
+          <a:off x="0" y="0"/>
+          <a:ext cx="0" cy="0"/>
+          <a:chOff x="0" y="0"/>
+          <a:chExt cx="0" cy="0"/>
+        </a:xfrm>
+      </p:grpSpPr>
+      <p:sp>
+        <p:nvSpPr>
+          <p:cNvPr id="2" name="Header Placeholder 1"/>
+          <p:cNvSpPr>
+            <a:spLocks noGrp="1"/>
+          </p:cNvSpPr>
+          <p:nvPr>
+            <p:ph type="hdr" sz="quarter"/>
+          </p:nvPr>
+        </p:nvSpPr>
+        <p:spPr>
+          <a:xfrm>
+            <a:off x="0" y="0"/>
+            <a:ext cx="2971800" cy="458788"/>
+          </a:xfrm>
+          <a:prstGeom prst="rect">
+            <a:avLst/>
+          </a:prstGeom>
+        </p:spPr>
+        <p:txBody>
+          <a:bodyPr vert="horz" lIns="91440" tIns="45720" rIns="91440" bIns="45720" rtlCol="0"/>
+          <a:lstStyle>
+            <a:lvl1pPr algn="l">
+              <a:defRPr sz="1200"/>
+            </a:lvl1pPr>
+          </a:lstStyle>
+          <a:p>
+            <a:endParaRPr lang="en-US"/>
+          </a:p>
+        </p:txBody>
+      </p:sp>
+      <p:sp>
+        <p:nvSpPr>
+          <p:cNvPr id="3" name="Date Placeholder 2"/>
+          <p:cNvSpPr>
+            <a:spLocks noGrp="1"/>
+          </p:cNvSpPr>
+          <p:nvPr>
+            <p:ph type="dt" idx="1"/>
+          </p:nvPr>
+        </p:nvSpPr>
+        <p:spPr>
+          <a:xfrm>
+            <a:off x="3884613" y="0"/>
+            <a:ext cx="2971800" cy="458788"/>
+          </a:xfrm>
+          <a:prstGeom prst="rect">
+            <a:avLst/>
+          </a:prstGeom>
+        </p:spPr>
+        <p:txBody>
+          <a:bodyPr vert="horz" lIns="91440" tIns="45720" rIns="91440" bIns="45720" rtlCol="0"/>
+          <a:lstStyle>
+            <a:lvl1pPr algn="r">
+              <a:defRPr sz="1200"/>
+            </a:lvl1pPr>
+          </a:lstStyle>
+          <a:p>
+            <a:fld id="{488DEB82-64A5-4949-B1B8-43950E15E476}" type="datetimeFigureOut">
+              <a:rPr lang="en-US" smtClean="0"/>
+              <a:t>4/7/19</a:t>
+            </a:fld>
+            <a:endParaRPr lang="en-US"/>
+          </a:p>
+        </p:txBody>
+      </p:sp>
+      <p:sp>
+        <p:nvSpPr>
+          <p:cNvPr id="4" name="Slide Image Placeholder 3"/>
+          <p:cNvSpPr>
+            <a:spLocks noGrp="1" noRot="1" noChangeAspect="1"/>
+          </p:cNvSpPr>
+          <p:nvPr>
+            <p:ph type="sldImg" idx="2"/>
+          </p:nvPr>
+        </p:nvSpPr>
+        <p:spPr>
+          <a:xfrm>
+            <a:off x="685800" y="1143000"/>
+            <a:ext cx="5486400" cy="3086100"/>
+          </a:xfrm>
+          <a:prstGeom prst="rect">
+            <a:avLst/>
+          </a:prstGeom>
+          <a:noFill/>
+          <a:ln w="12700">
+            <a:solidFill>
+              <a:prstClr val="black"/>
+            </a:solidFill>
+          </a:ln>
+        </p:spPr>
+        <p:txBody>
+          <a:bodyPr vert="horz" lIns="91440" tIns="45720" rIns="91440" bIns="45720" rtlCol="0" anchor="ctr"/>
+          <a:lstStyle/>
+          <a:p>
+            <a:endParaRPr lang="en-US"/>
+          </a:p>
+        </p:txBody>
+      </p:sp>
+      <p:sp>
+        <p:nvSpPr>
+          <p:cNvPr id="5" name="Notes Placeholder 4"/>
+          <p:cNvSpPr>
+            <a:spLocks noGrp="1"/>
+          </p:cNvSpPr>
+          <p:nvPr>
+            <p:ph type="body" sz="quarter" idx="3"/>
+          </p:nvPr>
+        </p:nvSpPr>
+        <p:spPr>
+          <a:xfrm>
+            <a:off x="685800" y="4400550"/>
+            <a:ext cx="5486400" cy="3600450"/>
+          </a:xfrm>
+          <a:prstGeom prst="rect">
+            <a:avLst/>
+          </a:prstGeom>
+        </p:spPr>
+        <p:txBody>
+          <a:bodyPr vert="horz" lIns="91440" tIns="45720" rIns="91440" bIns="45720" rtlCol="0"/>
+          <a:lstStyle/>
+          <a:p>
+            <a:pPr lvl="0"/>
+            <a:r>
+              <a:rPr lang="en-US"/>
+              <a:t>Click to edit Master text styles</a:t>
+            </a:r>
+          </a:p>
+          <a:p>
+            <a:pPr lvl="1"/>
+            <a:r>
+              <a:rPr lang="en-US"/>
+              <a:t>Second level</a:t>
+            </a:r>
+          </a:p>
+          <a:p>
+            <a:pPr lvl="2"/>
+            <a:r>
+              <a:rPr lang="en-US"/>
+              <a:t>Third level</a:t>
+            </a:r>
+          </a:p>
+          <a:p>
+            <a:pPr lvl="3"/>
+            <a:r>
+              <a:rPr lang="en-US"/>
+              <a:t>Fourth level</a:t>
+            </a:r>
+          </a:p>
+          <a:p>
+            <a:pPr lvl="4"/>
+            <a:r>
+              <a:rPr lang="en-US"/>
+              <a:t>Fifth level</a:t>
+            </a:r>
+          </a:p>
+        </p:txBody>
+      </p:sp>
+      <p:sp>
+        <p:nvSpPr>
+          <p:cNvPr id="6" name="Footer Placeholder 5"/>
+          <p:cNvSpPr>
+            <a:spLocks noGrp="1"/>
+          </p:cNvSpPr>
+          <p:nvPr>
+            <p:ph type="ftr" sz="quarter" idx="4"/>
+          </p:nvPr>
+        </p:nvSpPr>
+        <p:spPr>
+          <a:xfrm>
+            <a:off x="0" y="8685213"/>
+            <a:ext cx="2971800" cy="458787"/>
+          </a:xfrm>
+          <a:prstGeom prst="rect">
+            <a:avLst/>
+          </a:prstGeom>
+        </p:spPr>
+        <p:txBody>
+          <a:bodyPr vert="horz" lIns="91440" tIns="45720" rIns="91440" bIns="45720" rtlCol="0" anchor="b"/>
+          <a:lstStyle>
+            <a:lvl1pPr algn="l">
+              <a:defRPr sz="1200"/>
+            </a:lvl1pPr>
+          </a:lstStyle>
+          <a:p>
+            <a:endParaRPr lang="en-US"/>
+          </a:p>
+        </p:txBody>
+      </p:sp>
+      <p:sp>
+        <p:nvSpPr>
+          <p:cNvPr id="7" name="Slide Number Placeholder 6"/>
+          <p:cNvSpPr>
+            <a:spLocks noGrp="1"/>
+          </p:cNvSpPr>
+          <p:nvPr>
+            <p:ph type="sldNum" sz="quarter" idx="5"/>
+          </p:nvPr>
+        </p:nvSpPr>
+        <p:spPr>
+          <a:xfrm>
+            <a:off x="3884613" y="8685213"/>
+            <a:ext cx="2971800" cy="458787"/>
+          </a:xfrm>
+          <a:prstGeom prst="rect">
+            <a:avLst/>
+          </a:prstGeom>
+        </p:spPr>
+        <p:txBody>
+          <a:bodyPr vert="horz" lIns="91440" tIns="45720" rIns="91440" bIns="45720" rtlCol="0" anchor="b"/>
+          <a:lstStyle>
+            <a:lvl1pPr algn="r">
+              <a:defRPr sz="1200"/>
+            </a:lvl1pPr>
+          </a:lstStyle>
+          <a:p>
+            <a:fld id="{B8CB8DDB-920A-A14A-BC1A-FBB5963DB62A}" type="slidenum">
+              <a:rPr lang="en-US" smtClean="0"/>
+              <a:t>‹#›</a:t>
+            </a:fld>
+            <a:endParaRPr lang="en-US"/>
+          </a:p>
+        </p:txBody>
+      </p:sp>
+    </p:spTree>
+    <p:extLst>
+      <p:ext uri="{BB962C8B-B14F-4D97-AF65-F5344CB8AC3E}">
+        <p14:creationId xmlns:p14="http://schemas.microsoft.com/office/powerpoint/2010/main" val="3763630023"/>
+      </p:ext>
+    </p:extLst>
+  </p:cSld>
+  <p:clrMap bg1="lt1" tx1="dk1" bg2="lt2" tx2="dk2" accent1="accent1" accent2="accent2" accent3="accent3" accent4="accent4" accent5="accent5" accent6="accent6" hlink="hlink" folHlink="folHlink"/>
+  <p:notesStyle>
+    <a:lvl1pPr marL="0" algn="l" defTabSz="914400" rtl="0" eaLnBrk="1" latinLnBrk="0" hangingPunct="1">
+      <a:defRPr sz="1200" kern="1200">
+        <a:solidFill>
+          <a:schemeClr val="tx1"/>
+        </a:solidFill>
+        <a:latin typeface="+mn-lt"/>
+        <a:ea typeface="+mn-ea"/>
+        <a:cs typeface="+mn-cs"/>
+      </a:defRPr>
+    </a:lvl1pPr>
+    <a:lvl2pPr marL="457200" algn="l" defTabSz="914400" rtl="0" eaLnBrk="1" latinLnBrk="0" hangingPunct="1">
+      <a:defRPr sz="1200" kern="1200">
+        <a:solidFill>
+          <a:schemeClr val="tx1"/>
+        </a:solidFill>
+        <a:latin typeface="+mn-lt"/>
+        <a:ea typeface="+mn-ea"/>
+        <a:cs typeface="+mn-cs"/>
+      </a:defRPr>
+    </a:lvl2pPr>
+    <a:lvl3pPr marL="914400" algn="l" defTabSz="914400" rtl="0" eaLnBrk="1" latinLnBrk="0" hangingPunct="1">
+      <a:defRPr sz="1200" kern="1200">
+        <a:solidFill>
+          <a:schemeClr val="tx1"/>
+        </a:solidFill>
+        <a:latin typeface="+mn-lt"/>
+        <a:ea typeface="+mn-ea"/>
+        <a:cs typeface="+mn-cs"/>
+      </a:defRPr>
+    </a:lvl3pPr>
+    <a:lvl4pPr marL="1371600" algn="l" defTabSz="914400" rtl="0" eaLnBrk="1" latinLnBrk="0" hangingPunct="1">
+      <a:defRPr sz="1200" kern="1200">
+        <a:solidFill>
+          <a:schemeClr val="tx1"/>
+        </a:solidFill>
+        <a:latin typeface="+mn-lt"/>
+        <a:ea typeface="+mn-ea"/>
+        <a:cs typeface="+mn-cs"/>
+      </a:defRPr>
+    </a:lvl4pPr>
+    <a:lvl5pPr marL="1828800" algn="l" defTabSz="914400" rtl="0" eaLnBrk="1" latinLnBrk="0" hangingPunct="1">
+      <a:defRPr sz="1200" kern="1200">
+        <a:solidFill>
+          <a:schemeClr val="tx1"/>
+        </a:solidFill>
+        <a:latin typeface="+mn-lt"/>
+        <a:ea typeface="+mn-ea"/>
+        <a:cs typeface="+mn-cs"/>
+      </a:defRPr>
+    </a:lvl5pPr>
+    <a:lvl6pPr marL="2286000" algn="l" defTabSz="914400" rtl="0" eaLnBrk="1" latinLnBrk="0" hangingPunct="1">
+      <a:defRPr sz="1200" kern="1200">
+        <a:solidFill>
+          <a:schemeClr val="tx1"/>
+        </a:solidFill>
+        <a:latin typeface="+mn-lt"/>
+        <a:ea typeface="+mn-ea"/>
+        <a:cs typeface="+mn-cs"/>
+      </a:defRPr>
+    </a:lvl6pPr>
+    <a:lvl7pPr marL="2743200" algn="l" defTabSz="914400" rtl="0" eaLnBrk="1" latinLnBrk="0" hangingPunct="1">
+      <a:defRPr sz="1200" kern="1200">
+        <a:solidFill>
+          <a:schemeClr val="tx1"/>
+        </a:solidFill>
+        <a:latin typeface="+mn-lt"/>
+        <a:ea typeface="+mn-ea"/>
+        <a:cs typeface="+mn-cs"/>
+      </a:defRPr>
+    </a:lvl7pPr>
+    <a:lvl8pPr marL="3200400" algn="l" defTabSz="914400" rtl="0" eaLnBrk="1" latinLnBrk="0" hangingPunct="1">
+      <a:defRPr sz="1200" kern="1200">
+        <a:solidFill>
+          <a:schemeClr val="tx1"/>
+        </a:solidFill>
+        <a:latin typeface="+mn-lt"/>
+        <a:ea typeface="+mn-ea"/>
+        <a:cs typeface="+mn-cs"/>
+      </a:defRPr>
+    </a:lvl8pPr>
+    <a:lvl9pPr marL="3657600" algn="l" defTabSz="914400" rtl="0" eaLnBrk="1" latinLnBrk="0" hangingPunct="1">
+      <a:defRPr sz="1200" kern="1200">
+        <a:solidFill>
+          <a:schemeClr val="tx1"/>
+        </a:solidFill>
+        <a:latin typeface="+mn-lt"/>
+        <a:ea typeface="+mn-ea"/>
+        <a:cs typeface="+mn-cs"/>
+      </a:defRPr>
+    </a:lvl9pPr>
+  </p:notesStyle>
+</p:notesMaster>
+</file>
+
+<file path=ppt/notesSlides/notesSlide1.xml><?xml version="1.0" encoding="utf-8"?>
+<p:notes xmlns:a="http://schemas.openxmlformats.org/drawingml/2006/main" xmlns:r="http://schemas.openxmlformats.org/officeDocument/2006/relationships" xmlns:p="http://schemas.openxmlformats.org/presentationml/2006/main">
+  <p:cSld>
+    <p:spTree>
+      <p:nvGrpSpPr>
+        <p:cNvPr id="1" name=""/>
+        <p:cNvGrpSpPr/>
+        <p:nvPr/>
+      </p:nvGrpSpPr>
+      <p:grpSpPr>
+        <a:xfrm>
+          <a:off x="0" y="0"/>
+          <a:ext cx="0" cy="0"/>
+          <a:chOff x="0" y="0"/>
+          <a:chExt cx="0" cy="0"/>
+        </a:xfrm>
+      </p:grpSpPr>
+      <p:sp>
+        <p:nvSpPr>
+          <p:cNvPr id="2" name="Slide Image Placeholder 1"/>
+          <p:cNvSpPr>
+            <a:spLocks noGrp="1" noRot="1" noChangeAspect="1"/>
+          </p:cNvSpPr>
+          <p:nvPr>
+            <p:ph type="sldImg"/>
+          </p:nvPr>
+        </p:nvSpPr>
+        <p:spPr/>
+      </p:sp>
+      <p:sp>
+        <p:nvSpPr>
+          <p:cNvPr id="3" name="Notes Placeholder 2"/>
+          <p:cNvSpPr>
+            <a:spLocks noGrp="1"/>
+          </p:cNvSpPr>
+          <p:nvPr>
+            <p:ph type="body" idx="1"/>
+          </p:nvPr>
+        </p:nvSpPr>
+        <p:spPr/>
+        <p:txBody>
+          <a:bodyPr/>
+          <a:lstStyle/>
+          <a:p>
+            <a:endParaRPr lang="en-US" dirty="0"/>
+          </a:p>
+        </p:txBody>
+      </p:sp>
+      <p:sp>
+        <p:nvSpPr>
+          <p:cNvPr id="4" name="Slide Number Placeholder 3"/>
+          <p:cNvSpPr>
+            <a:spLocks noGrp="1"/>
+          </p:cNvSpPr>
+          <p:nvPr>
+            <p:ph type="sldNum" sz="quarter" idx="5"/>
+          </p:nvPr>
+        </p:nvSpPr>
+        <p:spPr/>
+        <p:txBody>
+          <a:bodyPr/>
+          <a:lstStyle/>
+          <a:p>
+            <a:fld id="{B8CB8DDB-920A-A14A-BC1A-FBB5963DB62A}" type="slidenum">
+              <a:rPr lang="en-US" smtClean="0"/>
+              <a:t>2</a:t>
+            </a:fld>
+            <a:endParaRPr lang="en-US"/>
+          </a:p>
+        </p:txBody>
+      </p:sp>
+    </p:spTree>
+    <p:extLst>
+      <p:ext uri="{BB962C8B-B14F-4D97-AF65-F5344CB8AC3E}">
+        <p14:creationId xmlns:p14="http://schemas.microsoft.com/office/powerpoint/2010/main" val="4230515175"/>
+      </p:ext>
+    </p:extLst>
+  </p:cSld>
+  <p:clrMapOvr>
+    <a:masterClrMapping/>
+  </p:clrMapOvr>
+</p:notes>
 </file>
 
 <file path=ppt/slideLayouts/slideLayout1.xml><?xml version="1.0" encoding="utf-8"?>
@@ -3222,7 +3658,7 @@
           <p:nvPr/>
         </p:nvPicPr>
         <p:blipFill>
-          <a:blip r:embed="rId2"/>
+          <a:blip r:embed="rId3"/>
           <a:stretch>
             <a:fillRect/>
           </a:stretch>
@@ -3981,4 +4417,299 @@
     </a:ext>
   </a:extLst>
 </a:theme>
+</file>
+
+<file path=ppt/theme/theme2.xml><?xml version="1.0" encoding="utf-8"?>
+<a:theme xmlns:a="http://schemas.openxmlformats.org/drawingml/2006/main" name="Office Theme">
+  <a:themeElements>
+    <a:clrScheme name="Office">
+      <a:dk1>
+        <a:sysClr val="windowText" lastClr="000000"/>
+      </a:dk1>
+      <a:lt1>
+        <a:sysClr val="window" lastClr="FFFFFF"/>
+      </a:lt1>
+      <a:dk2>
+        <a:srgbClr val="44546A"/>
+      </a:dk2>
+      <a:lt2>
+        <a:srgbClr val="E7E6E6"/>
+      </a:lt2>
+      <a:accent1>
+        <a:srgbClr val="4472C4"/>
+      </a:accent1>
+      <a:accent2>
+        <a:srgbClr val="ED7D31"/>
+      </a:accent2>
+      <a:accent3>
+        <a:srgbClr val="A5A5A5"/>
+      </a:accent3>
+      <a:accent4>
+        <a:srgbClr val="FFC000"/>
+      </a:accent4>
+      <a:accent5>
+        <a:srgbClr val="5B9BD5"/>
+      </a:accent5>
+      <a:accent6>
+        <a:srgbClr val="70AD47"/>
+      </a:accent6>
+      <a:hlink>
+        <a:srgbClr val="0563C1"/>
+      </a:hlink>
+      <a:folHlink>
+        <a:srgbClr val="954F72"/>
+      </a:folHlink>
+    </a:clrScheme>
+    <a:fontScheme name="Office">
+      <a:majorFont>
+        <a:latin typeface="Calibri Light" panose="020F0302020204030204"/>
+        <a:ea typeface=""/>
+        <a:cs typeface=""/>
+        <a:font script="Jpan" typeface="游ゴシック Light"/>
+        <a:font script="Hang" typeface="맑은 고딕"/>
+        <a:font script="Hans" typeface="等线 Light"/>
+        <a:font script="Hant" typeface="新細明體"/>
+        <a:font script="Arab" typeface="Times New Roman"/>
+        <a:font script="Hebr" typeface="Times New Roman"/>
+        <a:font script="Thai" typeface="Angsana New"/>
+        <a:font script="Ethi" typeface="Nyala"/>
+        <a:font script="Beng" typeface="Vrinda"/>
+        <a:font script="Gujr" typeface="Shruti"/>
+        <a:font script="Khmr" typeface="MoolBoran"/>
+        <a:font script="Knda" typeface="Tunga"/>
+        <a:font script="Guru" typeface="Raavi"/>
+        <a:font script="Cans" typeface="Euphemia"/>
+        <a:font script="Cher" typeface="Plantagenet Cherokee"/>
+        <a:font script="Yiii" typeface="Microsoft Yi Baiti"/>
+        <a:font script="Tibt" typeface="Microsoft Himalaya"/>
+        <a:font script="Thaa" typeface="MV Boli"/>
+        <a:font script="Deva" typeface="Mangal"/>
+        <a:font script="Telu" typeface="Gautami"/>
+        <a:font script="Taml" typeface="Latha"/>
+        <a:font script="Syrc" typeface="Estrangelo Edessa"/>
+        <a:font script="Orya" typeface="Kalinga"/>
+        <a:font script="Mlym" typeface="Kartika"/>
+        <a:font script="Laoo" typeface="DokChampa"/>
+        <a:font script="Sinh" typeface="Iskoola Pota"/>
+        <a:font script="Mong" typeface="Mongolian Baiti"/>
+        <a:font script="Viet" typeface="Times New Roman"/>
+        <a:font script="Uigh" typeface="Microsoft Uighur"/>
+        <a:font script="Geor" typeface="Sylfaen"/>
+        <a:font script="Armn" typeface="Arial"/>
+        <a:font script="Bugi" typeface="Leelawadee UI"/>
+        <a:font script="Bopo" typeface="Microsoft JhengHei"/>
+        <a:font script="Java" typeface="Javanese Text"/>
+        <a:font script="Lisu" typeface="Segoe UI"/>
+        <a:font script="Mymr" typeface="Myanmar Text"/>
+        <a:font script="Nkoo" typeface="Ebrima"/>
+        <a:font script="Olck" typeface="Nirmala UI"/>
+        <a:font script="Osma" typeface="Ebrima"/>
+        <a:font script="Phag" typeface="Phagspa"/>
+        <a:font script="Syrn" typeface="Estrangelo Edessa"/>
+        <a:font script="Syrj" typeface="Estrangelo Edessa"/>
+        <a:font script="Syre" typeface="Estrangelo Edessa"/>
+        <a:font script="Sora" typeface="Nirmala UI"/>
+        <a:font script="Tale" typeface="Microsoft Tai Le"/>
+        <a:font script="Talu" typeface="Microsoft New Tai Lue"/>
+        <a:font script="Tfng" typeface="Ebrima"/>
+      </a:majorFont>
+      <a:minorFont>
+        <a:latin typeface="Calibri" panose="020F0502020204030204"/>
+        <a:ea typeface=""/>
+        <a:cs typeface=""/>
+        <a:font script="Jpan" typeface="游ゴシック"/>
+        <a:font script="Hang" typeface="맑은 고딕"/>
+        <a:font script="Hans" typeface="等线"/>
+        <a:font script="Hant" typeface="新細明體"/>
+        <a:font script="Arab" typeface="Arial"/>
+        <a:font script="Hebr" typeface="Arial"/>
+        <a:font script="Thai" typeface="Cordia New"/>
+        <a:font script="Ethi" typeface="Nyala"/>
+        <a:font script="Beng" typeface="Vrinda"/>
+        <a:font script="Gujr" typeface="Shruti"/>
+        <a:font script="Khmr" typeface="DaunPenh"/>
+        <a:font script="Knda" typeface="Tunga"/>
+        <a:font script="Guru" typeface="Raavi"/>
+        <a:font script="Cans" typeface="Euphemia"/>
+        <a:font script="Cher" typeface="Plantagenet Cherokee"/>
+        <a:font script="Yiii" typeface="Microsoft Yi Baiti"/>
+        <a:font script="Tibt" typeface="Microsoft Himalaya"/>
+        <a:font script="Thaa" typeface="MV Boli"/>
+        <a:font script="Deva" typeface="Mangal"/>
+        <a:font script="Telu" typeface="Gautami"/>
+        <a:font script="Taml" typeface="Latha"/>
+        <a:font script="Syrc" typeface="Estrangelo Edessa"/>
+        <a:font script="Orya" typeface="Kalinga"/>
+        <a:font script="Mlym" typeface="Kartika"/>
+        <a:font script="Laoo" typeface="DokChampa"/>
+        <a:font script="Sinh" typeface="Iskoola Pota"/>
+        <a:font script="Mong" typeface="Mongolian Baiti"/>
+        <a:font script="Viet" typeface="Arial"/>
+        <a:font script="Uigh" typeface="Microsoft Uighur"/>
+        <a:font script="Geor" typeface="Sylfaen"/>
+        <a:font script="Armn" typeface="Arial"/>
+        <a:font script="Bugi" typeface="Leelawadee UI"/>
+        <a:font script="Bopo" typeface="Microsoft JhengHei"/>
+        <a:font script="Java" typeface="Javanese Text"/>
+        <a:font script="Lisu" typeface="Segoe UI"/>
+        <a:font script="Mymr" typeface="Myanmar Text"/>
+        <a:font script="Nkoo" typeface="Ebrima"/>
+        <a:font script="Olck" typeface="Nirmala UI"/>
+        <a:font script="Osma" typeface="Ebrima"/>
+        <a:font script="Phag" typeface="Phagspa"/>
+        <a:font script="Syrn" typeface="Estrangelo Edessa"/>
+        <a:font script="Syrj" typeface="Estrangelo Edessa"/>
+        <a:font script="Syre" typeface="Estrangelo Edessa"/>
+        <a:font script="Sora" typeface="Nirmala UI"/>
+        <a:font script="Tale" typeface="Microsoft Tai Le"/>
+        <a:font script="Talu" typeface="Microsoft New Tai Lue"/>
+        <a:font script="Tfng" typeface="Ebrima"/>
+      </a:minorFont>
+    </a:fontScheme>
+    <a:fmtScheme name="Office">
+      <a:fillStyleLst>
+        <a:solidFill>
+          <a:schemeClr val="phClr"/>
+        </a:solidFill>
+        <a:gradFill rotWithShape="1">
+          <a:gsLst>
+            <a:gs pos="0">
+              <a:schemeClr val="phClr">
+                <a:lumMod val="110000"/>
+                <a:satMod val="105000"/>
+                <a:tint val="67000"/>
+              </a:schemeClr>
+            </a:gs>
+            <a:gs pos="50000">
+              <a:schemeClr val="phClr">
+                <a:lumMod val="105000"/>
+                <a:satMod val="103000"/>
+                <a:tint val="73000"/>
+              </a:schemeClr>
+            </a:gs>
+            <a:gs pos="100000">
+              <a:schemeClr val="phClr">
+                <a:lumMod val="105000"/>
+                <a:satMod val="109000"/>
+                <a:tint val="81000"/>
+              </a:schemeClr>
+            </a:gs>
+          </a:gsLst>
+          <a:lin ang="5400000" scaled="0"/>
+        </a:gradFill>
+        <a:gradFill rotWithShape="1">
+          <a:gsLst>
+            <a:gs pos="0">
+              <a:schemeClr val="phClr">
+                <a:satMod val="103000"/>
+                <a:lumMod val="102000"/>
+                <a:tint val="94000"/>
+              </a:schemeClr>
+            </a:gs>
+            <a:gs pos="50000">
+              <a:schemeClr val="phClr">
+                <a:satMod val="110000"/>
+                <a:lumMod val="100000"/>
+                <a:shade val="100000"/>
+              </a:schemeClr>
+            </a:gs>
+            <a:gs pos="100000">
+              <a:schemeClr val="phClr">
+                <a:lumMod val="99000"/>
+                <a:satMod val="120000"/>
+                <a:shade val="78000"/>
+              </a:schemeClr>
+            </a:gs>
+          </a:gsLst>
+          <a:lin ang="5400000" scaled="0"/>
+        </a:gradFill>
+      </a:fillStyleLst>
+      <a:lnStyleLst>
+        <a:ln w="6350" cap="flat" cmpd="sng" algn="ctr">
+          <a:solidFill>
+            <a:schemeClr val="phClr"/>
+          </a:solidFill>
+          <a:prstDash val="solid"/>
+          <a:miter lim="800000"/>
+        </a:ln>
+        <a:ln w="12700" cap="flat" cmpd="sng" algn="ctr">
+          <a:solidFill>
+            <a:schemeClr val="phClr"/>
+          </a:solidFill>
+          <a:prstDash val="solid"/>
+          <a:miter lim="800000"/>
+        </a:ln>
+        <a:ln w="19050" cap="flat" cmpd="sng" algn="ctr">
+          <a:solidFill>
+            <a:schemeClr val="phClr"/>
+          </a:solidFill>
+          <a:prstDash val="solid"/>
+          <a:miter lim="800000"/>
+        </a:ln>
+      </a:lnStyleLst>
+      <a:effectStyleLst>
+        <a:effectStyle>
+          <a:effectLst/>
+        </a:effectStyle>
+        <a:effectStyle>
+          <a:effectLst/>
+        </a:effectStyle>
+        <a:effectStyle>
+          <a:effectLst>
+            <a:outerShdw blurRad="57150" dist="19050" dir="5400000" algn="ctr" rotWithShape="0">
+              <a:srgbClr val="000000">
+                <a:alpha val="63000"/>
+              </a:srgbClr>
+            </a:outerShdw>
+          </a:effectLst>
+        </a:effectStyle>
+      </a:effectStyleLst>
+      <a:bgFillStyleLst>
+        <a:solidFill>
+          <a:schemeClr val="phClr"/>
+        </a:solidFill>
+        <a:solidFill>
+          <a:schemeClr val="phClr">
+            <a:tint val="95000"/>
+            <a:satMod val="170000"/>
+          </a:schemeClr>
+        </a:solidFill>
+        <a:gradFill rotWithShape="1">
+          <a:gsLst>
+            <a:gs pos="0">
+              <a:schemeClr val="phClr">
+                <a:tint val="93000"/>
+                <a:satMod val="150000"/>
+                <a:shade val="98000"/>
+                <a:lumMod val="102000"/>
+              </a:schemeClr>
+            </a:gs>
+            <a:gs pos="50000">
+              <a:schemeClr val="phClr">
+                <a:tint val="98000"/>
+                <a:satMod val="130000"/>
+                <a:shade val="90000"/>
+                <a:lumMod val="103000"/>
+              </a:schemeClr>
+            </a:gs>
+            <a:gs pos="100000">
+              <a:schemeClr val="phClr">
+                <a:shade val="63000"/>
+                <a:satMod val="120000"/>
+              </a:schemeClr>
+            </a:gs>
+          </a:gsLst>
+          <a:lin ang="5400000" scaled="0"/>
+        </a:gradFill>
+      </a:bgFillStyleLst>
+    </a:fmtScheme>
+  </a:themeElements>
+  <a:objectDefaults/>
+  <a:extraClrSchemeLst/>
+  <a:extLst>
+    <a:ext uri="{05A4C25C-085E-4340-85A3-A5531E510DB2}">
+      <thm15:themeFamily xmlns:thm15="http://schemas.microsoft.com/office/thememl/2012/main" name="Office Theme" id="{62F939B6-93AF-4DB8-9C6B-D6C7DFDC589F}" vid="{4A3C46E8-61CC-4603-A589-7422A47A8E4A}"/>
+    </a:ext>
+  </a:extLst>
+</a:theme>
 </file>
</xml_diff>

<commit_message>
CheatSheet PPT and PDF updates
</commit_message>
<xml_diff>
--- a/CheatSheet/ppt/CheatSheet.pptx
+++ b/CheatSheet/ppt/CheatSheet.pptx
@@ -245,7 +245,7 @@
           <a:p>
             <a:fld id="{BE6CBB9B-FF91-4773-8CCD-ABC0ABE2DDD5}" type="datetimeFigureOut">
               <a:rPr lang="en-US" smtClean="0"/>
-              <a:t>5/7/19</a:t>
+              <a:t>5/7/2019</a:t>
             </a:fld>
             <a:endParaRPr lang="en-US"/>
           </a:p>
@@ -3260,7 +3260,7 @@
                 <a:hlinkClick r:id="rId3">
                   <a:extLst>
                     <a:ext uri="{A12FA001-AC4F-418D-AE19-62706E023703}">
-                      <ahyp:hlinkClr xmlns:ahyp="http://schemas.microsoft.com/office/drawing/2018/hyperlinkcolor" val="tx"/>
+                      <ahyp:hlinkClr xmlns:ahyp="http://schemas.microsoft.com/office/drawing/2018/hyperlinkcolor" xmlns="" val="tx"/>
                     </a:ext>
                   </a:extLst>
                 </a:hlinkClick>
@@ -4591,7 +4591,7 @@
           <p:nvPr>
             <p:extLst>
               <p:ext uri="{D42A27DB-BD31-4B8C-83A1-F6EECF244321}">
-                <p14:modId xmlns:p14="http://schemas.microsoft.com/office/powerpoint/2010/main" val="3250275266"/>
+                <p14:modId xmlns:p14="http://schemas.microsoft.com/office/powerpoint/2010/main" val="1375394274"/>
               </p:ext>
             </p:extLst>
           </p:nvPr>
@@ -4939,14 +4939,25 @@
                     <a:bodyPr/>
                     <a:lstStyle/>
                     <a:p>
+                      <a:pPr marL="0" algn="l" defTabSz="754361" rtl="0" eaLnBrk="1" latinLnBrk="0" hangingPunct="1"/>
                       <a:r>
-                        <a:rPr lang="en-US" sz="800" dirty="0"/>
-                        <a:t>40.15</a:t>
+                        <a:rPr lang="en-US" sz="800" kern="1200" dirty="0" smtClean="0">
+                          <a:solidFill>
+                            <a:schemeClr val="dk1"/>
+                          </a:solidFill>
+                          <a:latin typeface="+mn-lt"/>
+                          <a:ea typeface="+mn-ea"/>
+                          <a:cs typeface="+mn-cs"/>
+                        </a:rPr>
+                        <a:t>27.625</a:t>
                       </a:r>
-                      <a:endParaRPr lang="en-US" sz="800" dirty="0">
+                      <a:endParaRPr lang="en-US" sz="800" kern="1200" dirty="0">
                         <a:solidFill>
-                          <a:schemeClr val="accent4"/>
+                          <a:schemeClr val="dk1"/>
                         </a:solidFill>
+                        <a:latin typeface="+mn-lt"/>
+                        <a:ea typeface="+mn-ea"/>
+                        <a:cs typeface="+mn-cs"/>
                       </a:endParaRPr>
                     </a:p>
                   </a:txBody>
@@ -4958,8 +4969,12 @@
                     <a:lstStyle/>
                     <a:p>
                       <a:r>
-                        <a:rPr lang="en-US" sz="800" dirty="0"/>
-                        <a:t>8</a:t>
+                        <a:rPr lang="en-US" sz="800" dirty="0" smtClean="0">
+                          <a:solidFill>
+                            <a:schemeClr val="dk1"/>
+                          </a:solidFill>
+                        </a:rPr>
+                        <a:t>55.25</a:t>
                       </a:r>
                       <a:endParaRPr lang="en-US" sz="800" dirty="0">
                         <a:solidFill>
@@ -5752,7 +5767,7 @@
           <p:nvPr/>
         </p:nvPicPr>
         <p:blipFill>
-          <a:blip r:embed="rId4">
+          <a:blip r:embed="rId4" cstate="hqprint">
             <a:biLevel thresh="25000"/>
             <a:extLst>
               <a:ext uri="{28A0092B-C50C-407E-A947-70E740481C1C}">
@@ -10694,7 +10709,7 @@
           <p:nvPr>
             <p:extLst>
               <p:ext uri="{D42A27DB-BD31-4B8C-83A1-F6EECF244321}">
-                <p14:modId xmlns:p14="http://schemas.microsoft.com/office/powerpoint/2010/main" val="2199308527"/>
+                <p14:modId xmlns:p14="http://schemas.microsoft.com/office/powerpoint/2010/main" val="1930946370"/>
               </p:ext>
             </p:extLst>
           </p:nvPr>
@@ -10803,7 +10818,7 @@
                     <a:lstStyle/>
                     <a:p>
                       <a:r>
-                        <a:rPr lang="en-US" sz="800" b="1" kern="1200" dirty="0" err="1">
+                        <a:rPr lang="en-US" sz="800" b="1" kern="1200" dirty="0" smtClean="0">
                           <a:solidFill>
                             <a:schemeClr val="accent4"/>
                           </a:solidFill>
@@ -10811,7 +10826,7 @@
                           <a:ea typeface="+mn-ea"/>
                           <a:cs typeface="+mn-cs"/>
                         </a:rPr>
-                        <a:t>dist</a:t>
+                        <a:t>distance</a:t>
                       </a:r>
                       <a:endParaRPr lang="en-US" sz="800" b="1" kern="1200" dirty="0">
                         <a:solidFill>
@@ -10847,6 +10862,17 @@
                     <a:p>
                       <a:pPr marL="0" algn="l" defTabSz="754361" rtl="0" eaLnBrk="1" latinLnBrk="0" hangingPunct="1"/>
                       <a:r>
+                        <a:rPr lang="en-US" sz="800" kern="1200" dirty="0" smtClean="0">
+                          <a:solidFill>
+                            <a:schemeClr val="accent4"/>
+                          </a:solidFill>
+                          <a:latin typeface="+mn-lt"/>
+                          <a:ea typeface="+mn-ea"/>
+                          <a:cs typeface="+mn-cs"/>
+                        </a:rPr>
+                        <a:t>2015-01-01 </a:t>
+                      </a:r>
+                      <a:r>
                         <a:rPr lang="en-US" sz="800" kern="1200" dirty="0">
                           <a:solidFill>
                             <a:schemeClr val="accent4"/>
@@ -10855,7 +10881,7 @@
                           <a:ea typeface="+mn-ea"/>
                           <a:cs typeface="+mn-cs"/>
                         </a:rPr>
-                        <a:t>2015:01:01 10:00:00</a:t>
+                        <a:t>10:00:00</a:t>
                       </a:r>
                     </a:p>
                   </a:txBody>
@@ -10938,6 +10964,17 @@
                         <a:defRPr/>
                       </a:pPr>
                       <a:r>
+                        <a:rPr lang="en-US" sz="800" kern="1200" dirty="0" smtClean="0">
+                          <a:solidFill>
+                            <a:schemeClr val="accent4"/>
+                          </a:solidFill>
+                          <a:latin typeface="+mn-lt"/>
+                          <a:ea typeface="+mn-ea"/>
+                          <a:cs typeface="+mn-cs"/>
+                        </a:rPr>
+                        <a:t>2015-01-01 </a:t>
+                      </a:r>
+                      <a:r>
                         <a:rPr lang="en-US" sz="800" kern="1200" dirty="0">
                           <a:solidFill>
                             <a:schemeClr val="accent4"/>
@@ -10946,7 +10983,7 @@
                           <a:ea typeface="+mn-ea"/>
                           <a:cs typeface="+mn-cs"/>
                         </a:rPr>
-                        <a:t>2015:01:01 11:00:00</a:t>
+                        <a:t>11:00:00</a:t>
                       </a:r>
                     </a:p>
                   </a:txBody>
@@ -11029,6 +11066,17 @@
                         <a:defRPr/>
                       </a:pPr>
                       <a:r>
+                        <a:rPr lang="en-US" sz="800" kern="1200" dirty="0" smtClean="0">
+                          <a:solidFill>
+                            <a:schemeClr val="accent4"/>
+                          </a:solidFill>
+                          <a:latin typeface="+mn-lt"/>
+                          <a:ea typeface="+mn-ea"/>
+                          <a:cs typeface="+mn-cs"/>
+                        </a:rPr>
+                        <a:t>2015-01-02 </a:t>
+                      </a:r>
+                      <a:r>
                         <a:rPr lang="en-US" sz="800" kern="1200" dirty="0">
                           <a:solidFill>
                             <a:schemeClr val="accent4"/>
@@ -11037,7 +11085,7 @@
                           <a:ea typeface="+mn-ea"/>
                           <a:cs typeface="+mn-cs"/>
                         </a:rPr>
-                        <a:t>2015:01:02 10:00:00</a:t>
+                        <a:t>10:00:00</a:t>
                       </a:r>
                     </a:p>
                   </a:txBody>
@@ -11120,6 +11168,17 @@
                         <a:defRPr/>
                       </a:pPr>
                       <a:r>
+                        <a:rPr lang="en-US" sz="800" kern="1200" dirty="0" smtClean="0">
+                          <a:solidFill>
+                            <a:schemeClr val="accent4"/>
+                          </a:solidFill>
+                          <a:latin typeface="+mn-lt"/>
+                          <a:ea typeface="+mn-ea"/>
+                          <a:cs typeface="+mn-cs"/>
+                        </a:rPr>
+                        <a:t>2015-01-02 </a:t>
+                      </a:r>
+                      <a:r>
                         <a:rPr lang="en-US" sz="800" kern="1200" dirty="0">
                           <a:solidFill>
                             <a:schemeClr val="accent4"/>
@@ -11128,7 +11187,7 @@
                           <a:ea typeface="+mn-ea"/>
                           <a:cs typeface="+mn-cs"/>
                         </a:rPr>
-                        <a:t>2015:01:02 10:00:00</a:t>
+                        <a:t>10:00:00</a:t>
                       </a:r>
                     </a:p>
                   </a:txBody>
@@ -12267,7 +12326,7 @@
           <p:nvPr>
             <p:extLst>
               <p:ext uri="{D42A27DB-BD31-4B8C-83A1-F6EECF244321}">
-                <p14:modId xmlns:p14="http://schemas.microsoft.com/office/powerpoint/2010/main" val="1261588646"/>
+                <p14:modId xmlns:p14="http://schemas.microsoft.com/office/powerpoint/2010/main" val="2066267436"/>
               </p:ext>
             </p:extLst>
           </p:nvPr>
@@ -12283,14 +12342,14 @@
                 <a:tableStyleId>{68D230F3-CF80-4859-8CE7-A43EE81993B5}</a:tableStyleId>
               </a:tblPr>
               <a:tblGrid>
-                <a:gridCol w="923229">
+                <a:gridCol w="832336">
                   <a:extLst>
                     <a:ext uri="{9D8B030D-6E8A-4147-A177-3AD203B41FA5}">
                       <a16:colId xmlns:a16="http://schemas.microsoft.com/office/drawing/2014/main" val="2434985560"/>
                     </a:ext>
                   </a:extLst>
                 </a:gridCol>
-                <a:gridCol w="652265">
+                <a:gridCol w="743158">
                   <a:extLst>
                     <a:ext uri="{9D8B030D-6E8A-4147-A177-3AD203B41FA5}">
                       <a16:colId xmlns:a16="http://schemas.microsoft.com/office/drawing/2014/main" val="78214017"/>
@@ -12319,7 +12378,7 @@
                     <a:lstStyle/>
                     <a:p>
                       <a:r>
-                        <a:rPr lang="en-US" sz="800" b="1" kern="1200" dirty="0" err="1">
+                        <a:rPr lang="en-US" sz="800" b="1" kern="1200" dirty="0" err="1" smtClean="0">
                           <a:solidFill>
                             <a:schemeClr val="accent4"/>
                           </a:solidFill>
@@ -12327,7 +12386,7 @@
                           <a:ea typeface="+mn-ea"/>
                           <a:cs typeface="+mn-cs"/>
                         </a:rPr>
-                        <a:t>pickup_dt</a:t>
+                        <a:t>pickup_date</a:t>
                       </a:r>
                       <a:endParaRPr lang="en-US" sz="800" b="1" kern="1200" dirty="0">
                         <a:solidFill>
@@ -12355,7 +12414,7 @@
                     <a:lstStyle/>
                     <a:p>
                       <a:r>
-                        <a:rPr lang="en-US" sz="800" b="1" kern="1200" dirty="0" err="1">
+                        <a:rPr lang="en-US" sz="800" b="1" kern="1200" dirty="0" err="1" smtClean="0">
                           <a:solidFill>
                             <a:schemeClr val="accent4"/>
                           </a:solidFill>
@@ -12363,7 +12422,7 @@
                           <a:ea typeface="+mn-ea"/>
                           <a:cs typeface="+mn-cs"/>
                         </a:rPr>
-                        <a:t>pickup_tm</a:t>
+                        <a:t>pickup_time</a:t>
                       </a:r>
                       <a:endParaRPr lang="en-US" sz="800" b="1" kern="1200" dirty="0">
                         <a:solidFill>
@@ -12419,7 +12478,7 @@
                     <a:lstStyle/>
                     <a:p>
                       <a:r>
-                        <a:rPr lang="en-US" sz="800" b="1" kern="1200" dirty="0" err="1">
+                        <a:rPr lang="en-US" sz="800" b="1" kern="1200" dirty="0" smtClean="0">
                           <a:solidFill>
                             <a:schemeClr val="accent4"/>
                           </a:solidFill>
@@ -12427,7 +12486,7 @@
                           <a:ea typeface="+mn-ea"/>
                           <a:cs typeface="+mn-cs"/>
                         </a:rPr>
-                        <a:t>dist</a:t>
+                        <a:t>distance</a:t>
                       </a:r>
                       <a:endParaRPr lang="en-US" sz="800" b="1" kern="1200" dirty="0">
                         <a:solidFill>
@@ -13154,7 +13213,7 @@
           <p:nvPr/>
         </p:nvPicPr>
         <p:blipFill>
-          <a:blip r:embed="rId2">
+          <a:blip r:embed="rId2" cstate="hqprint">
             <a:biLevel thresh="25000"/>
             <a:extLst>
               <a:ext uri="{28A0092B-C50C-407E-A947-70E740481C1C}">
@@ -17427,14 +17486,14 @@
           <p:nvPr>
             <p:extLst>
               <p:ext uri="{D42A27DB-BD31-4B8C-83A1-F6EECF244321}">
-                <p14:modId xmlns:p14="http://schemas.microsoft.com/office/powerpoint/2010/main" val="1730653478"/>
+                <p14:modId xmlns:p14="http://schemas.microsoft.com/office/powerpoint/2010/main" val="856144298"/>
               </p:ext>
             </p:extLst>
           </p:nvPr>
         </p:nvGraphicFramePr>
         <p:xfrm>
           <a:off x="6057311" y="4658912"/>
-          <a:ext cx="1025506" cy="2133600"/>
+          <a:ext cx="1143588" cy="2133600"/>
         </p:xfrm>
         <a:graphic>
           <a:graphicData uri="http://schemas.openxmlformats.org/drawingml/2006/table">
@@ -17443,14 +17502,14 @@
                 <a:tableStyleId>{68D230F3-CF80-4859-8CE7-A43EE81993B5}</a:tableStyleId>
               </a:tblPr>
               <a:tblGrid>
-                <a:gridCol w="483639">
+                <a:gridCol w="505414">
                   <a:extLst>
                     <a:ext uri="{9D8B030D-6E8A-4147-A177-3AD203B41FA5}">
                       <a16:colId xmlns:a16="http://schemas.microsoft.com/office/drawing/2014/main" val="3199580735"/>
                     </a:ext>
                   </a:extLst>
                 </a:gridCol>
-                <a:gridCol w="541867">
+                <a:gridCol w="638174">
                   <a:extLst>
                     <a:ext uri="{9D8B030D-6E8A-4147-A177-3AD203B41FA5}">
                       <a16:colId xmlns:a16="http://schemas.microsoft.com/office/drawing/2014/main" val="506638656"/>
@@ -17540,7 +17599,7 @@
                     <a:lstStyle/>
                     <a:p>
                       <a:r>
-                        <a:rPr lang="en-US" sz="800" kern="1200" dirty="0">
+                        <a:rPr lang="en-US" sz="800" kern="1200" dirty="0" smtClean="0">
                           <a:solidFill>
                             <a:schemeClr val="accent4"/>
                           </a:solidFill>
@@ -17548,8 +17607,16 @@
                           <a:ea typeface="+mn-ea"/>
                           <a:cs typeface="+mn-cs"/>
                         </a:rPr>
-                        <a:t>group</a:t>
+                        <a:t>GROUP</a:t>
                       </a:r>
+                      <a:endParaRPr lang="en-US" sz="800" kern="1200" dirty="0">
+                        <a:solidFill>
+                          <a:schemeClr val="accent4"/>
+                        </a:solidFill>
+                        <a:latin typeface="+mn-lt"/>
+                        <a:ea typeface="+mn-ea"/>
+                        <a:cs typeface="+mn-cs"/>
+                      </a:endParaRPr>
                     </a:p>
                   </a:txBody>
                   <a:tcPr/>
@@ -17594,7 +17661,7 @@
                     <a:lstStyle/>
                     <a:p>
                       <a:r>
-                        <a:rPr lang="en-US" sz="800" kern="1200" dirty="0">
+                        <a:rPr lang="en-US" sz="800" kern="1200" dirty="0" smtClean="0">
                           <a:solidFill>
                             <a:schemeClr val="accent4"/>
                           </a:solidFill>
@@ -17602,8 +17669,16 @@
                           <a:ea typeface="+mn-ea"/>
                           <a:cs typeface="+mn-cs"/>
                         </a:rPr>
-                        <a:t>cool</a:t>
+                        <a:t>COOL</a:t>
                       </a:r>
+                      <a:endParaRPr lang="en-US" sz="800" kern="1200" dirty="0">
+                        <a:solidFill>
+                          <a:schemeClr val="accent4"/>
+                        </a:solidFill>
+                        <a:latin typeface="+mn-lt"/>
+                        <a:ea typeface="+mn-ea"/>
+                        <a:cs typeface="+mn-cs"/>
+                      </a:endParaRPr>
                     </a:p>
                   </a:txBody>
                   <a:tcPr>
@@ -17648,7 +17723,7 @@
                     <a:lstStyle/>
                     <a:p>
                       <a:r>
-                        <a:rPr lang="en-US" sz="800" kern="1200" spc="-30" baseline="0" dirty="0">
+                        <a:rPr lang="en-US" sz="800" kern="1200" spc="-30" baseline="0" dirty="0" smtClean="0">
                           <a:solidFill>
                             <a:schemeClr val="accent4"/>
                           </a:solidFill>
@@ -17656,8 +17731,16 @@
                           <a:ea typeface="+mn-ea"/>
                           <a:cs typeface="+mn-cs"/>
                         </a:rPr>
-                        <a:t>talkative</a:t>
+                        <a:t>TALKATIVE</a:t>
                       </a:r>
+                      <a:endParaRPr lang="en-US" sz="800" kern="1200" spc="-30" baseline="0" dirty="0">
+                        <a:solidFill>
+                          <a:schemeClr val="accent4"/>
+                        </a:solidFill>
+                        <a:latin typeface="+mn-lt"/>
+                        <a:ea typeface="+mn-ea"/>
+                        <a:cs typeface="+mn-cs"/>
+                      </a:endParaRPr>
                     </a:p>
                   </a:txBody>
                   <a:tcPr/>
@@ -17702,7 +17785,7 @@
                     <a:lstStyle/>
                     <a:p>
                       <a:r>
-                        <a:rPr lang="en-US" sz="800" kern="1200" dirty="0">
+                        <a:rPr lang="en-US" sz="800" kern="1200" dirty="0" smtClean="0">
                           <a:solidFill>
                             <a:schemeClr val="accent4"/>
                           </a:solidFill>
@@ -17710,8 +17793,16 @@
                           <a:ea typeface="+mn-ea"/>
                           <a:cs typeface="+mn-cs"/>
                         </a:rPr>
-                        <a:t>calm</a:t>
+                        <a:t>CALM</a:t>
                       </a:r>
+                      <a:endParaRPr lang="en-US" sz="800" kern="1200" dirty="0">
+                        <a:solidFill>
+                          <a:schemeClr val="accent4"/>
+                        </a:solidFill>
+                        <a:latin typeface="+mn-lt"/>
+                        <a:ea typeface="+mn-ea"/>
+                        <a:cs typeface="+mn-cs"/>
+                      </a:endParaRPr>
                     </a:p>
                   </a:txBody>
                   <a:tcPr>
@@ -17763,7 +17854,7 @@
                     <a:lstStyle/>
                     <a:p>
                       <a:r>
-                        <a:rPr lang="en-US" sz="800" kern="1200" dirty="0">
+                        <a:rPr lang="en-US" sz="800" kern="1200" dirty="0" smtClean="0">
                           <a:solidFill>
                             <a:schemeClr val="accent4"/>
                           </a:solidFill>
@@ -17771,8 +17862,16 @@
                           <a:ea typeface="+mn-ea"/>
                           <a:cs typeface="+mn-cs"/>
                         </a:rPr>
-                        <a:t>quiet</a:t>
+                        <a:t>QUIET</a:t>
                       </a:r>
+                      <a:endParaRPr lang="en-US" sz="800" kern="1200" dirty="0">
+                        <a:solidFill>
+                          <a:schemeClr val="accent4"/>
+                        </a:solidFill>
+                        <a:latin typeface="+mn-lt"/>
+                        <a:ea typeface="+mn-ea"/>
+                        <a:cs typeface="+mn-cs"/>
+                      </a:endParaRPr>
                     </a:p>
                   </a:txBody>
                   <a:tcPr>
@@ -17824,7 +17923,7 @@
                     <a:lstStyle/>
                     <a:p>
                       <a:r>
-                        <a:rPr lang="en-US" sz="800" kern="1200" dirty="0">
+                        <a:rPr lang="en-US" sz="800" kern="1200" dirty="0" smtClean="0">
                           <a:solidFill>
                             <a:schemeClr val="accent4"/>
                           </a:solidFill>
@@ -17832,8 +17931,16 @@
                           <a:ea typeface="+mn-ea"/>
                           <a:cs typeface="+mn-cs"/>
                         </a:rPr>
-                        <a:t>temper</a:t>
+                        <a:t>TEMPER</a:t>
                       </a:r>
+                      <a:endParaRPr lang="en-US" sz="800" kern="1200" dirty="0">
+                        <a:solidFill>
+                          <a:schemeClr val="accent4"/>
+                        </a:solidFill>
+                        <a:latin typeface="+mn-lt"/>
+                        <a:ea typeface="+mn-ea"/>
+                        <a:cs typeface="+mn-cs"/>
+                      </a:endParaRPr>
                     </a:p>
                   </a:txBody>
                   <a:tcPr>
@@ -17885,7 +17992,7 @@
                     <a:lstStyle/>
                     <a:p>
                       <a:r>
-                        <a:rPr lang="en-US" sz="800" kern="1200" dirty="0">
+                        <a:rPr lang="en-US" sz="800" kern="1200" dirty="0" smtClean="0">
                           <a:solidFill>
                             <a:schemeClr val="accent4"/>
                           </a:solidFill>
@@ -17893,8 +18000,16 @@
                           <a:ea typeface="+mn-ea"/>
                           <a:cs typeface="+mn-cs"/>
                         </a:rPr>
-                        <a:t>nasty</a:t>
+                        <a:t>NASTY</a:t>
                       </a:r>
+                      <a:endParaRPr lang="en-US" sz="800" kern="1200" dirty="0">
+                        <a:solidFill>
+                          <a:schemeClr val="accent4"/>
+                        </a:solidFill>
+                        <a:latin typeface="+mn-lt"/>
+                        <a:ea typeface="+mn-ea"/>
+                        <a:cs typeface="+mn-cs"/>
+                      </a:endParaRPr>
                     </a:p>
                   </a:txBody>
                   <a:tcPr>
@@ -17943,7 +18058,7 @@
                     <a:lstStyle/>
                     <a:p>
                       <a:r>
-                        <a:rPr lang="en-US" sz="800" kern="1200" dirty="0">
+                        <a:rPr lang="en-US" sz="800" kern="1200" dirty="0" smtClean="0">
                           <a:solidFill>
                             <a:schemeClr val="accent4"/>
                           </a:solidFill>
@@ -17951,8 +18066,16 @@
                           <a:ea typeface="+mn-ea"/>
                           <a:cs typeface="+mn-cs"/>
                         </a:rPr>
-                        <a:t>drunk</a:t>
+                        <a:t>DRUNK</a:t>
                       </a:r>
+                      <a:endParaRPr lang="en-US" sz="800" kern="1200" dirty="0">
+                        <a:solidFill>
+                          <a:schemeClr val="accent4"/>
+                        </a:solidFill>
+                        <a:latin typeface="+mn-lt"/>
+                        <a:ea typeface="+mn-ea"/>
+                        <a:cs typeface="+mn-cs"/>
+                      </a:endParaRPr>
                     </a:p>
                   </a:txBody>
                   <a:tcPr>
@@ -17998,7 +18121,7 @@
                     <a:lstStyle/>
                     <a:p>
                       <a:r>
-                        <a:rPr lang="en-US" sz="800" kern="1200" dirty="0">
+                        <a:rPr lang="en-US" sz="800" kern="1200" dirty="0" smtClean="0">
                           <a:solidFill>
                             <a:schemeClr val="accent4"/>
                           </a:solidFill>
@@ -18006,8 +18129,16 @@
                           <a:ea typeface="+mn-ea"/>
                           <a:cs typeface="+mn-cs"/>
                         </a:rPr>
-                        <a:t>smell</a:t>
+                        <a:t>SMELL</a:t>
                       </a:r>
+                      <a:endParaRPr lang="en-US" sz="800" kern="1200" dirty="0">
+                        <a:solidFill>
+                          <a:schemeClr val="accent4"/>
+                        </a:solidFill>
+                        <a:latin typeface="+mn-lt"/>
+                        <a:ea typeface="+mn-ea"/>
+                        <a:cs typeface="+mn-cs"/>
+                      </a:endParaRPr>
                     </a:p>
                   </a:txBody>
                   <a:tcPr>
@@ -18040,8 +18171,8 @@
         </p:nvSpPr>
         <p:spPr>
           <a:xfrm>
-            <a:off x="6056675" y="4470910"/>
-            <a:ext cx="1025506" cy="191222"/>
+            <a:off x="6045526" y="4470910"/>
+            <a:ext cx="1155373" cy="195096"/>
           </a:xfrm>
           <a:prstGeom prst="rect">
             <a:avLst/>
@@ -18169,7 +18300,7 @@
           <p:nvPr>
             <p:extLst>
               <p:ext uri="{D42A27DB-BD31-4B8C-83A1-F6EECF244321}">
-                <p14:modId xmlns:p14="http://schemas.microsoft.com/office/powerpoint/2010/main" val="4032786776"/>
+                <p14:modId xmlns:p14="http://schemas.microsoft.com/office/powerpoint/2010/main" val="2421594542"/>
               </p:ext>
             </p:extLst>
           </p:nvPr>
@@ -19609,7 +19740,7 @@
                         <a:defRPr/>
                       </a:pPr>
                       <a:r>
-                        <a:rPr lang="en-US" sz="800" kern="1200" dirty="0">
+                        <a:rPr lang="en-US" sz="800" kern="1200" dirty="0" smtClean="0">
                           <a:solidFill>
                             <a:schemeClr val="accent4"/>
                           </a:solidFill>
@@ -19617,8 +19748,16 @@
                           <a:ea typeface="+mn-ea"/>
                           <a:cs typeface="+mn-cs"/>
                         </a:rPr>
-                        <a:t>2015-01-2</a:t>
+                        <a:t>2015-01-02</a:t>
                       </a:r>
+                      <a:endParaRPr lang="en-US" sz="800" kern="1200" dirty="0">
+                        <a:solidFill>
+                          <a:schemeClr val="accent4"/>
+                        </a:solidFill>
+                        <a:latin typeface="+mn-lt"/>
+                        <a:ea typeface="+mn-ea"/>
+                        <a:cs typeface="+mn-cs"/>
+                      </a:endParaRPr>
                     </a:p>
                   </a:txBody>
                   <a:tcPr marL="44963" marR="44963" marT="22481" marB="22481">
@@ -20259,7 +20398,7 @@
           <p:nvPr>
             <p:extLst>
               <p:ext uri="{D42A27DB-BD31-4B8C-83A1-F6EECF244321}">
-                <p14:modId xmlns:p14="http://schemas.microsoft.com/office/powerpoint/2010/main" val="1724712754"/>
+                <p14:modId xmlns:p14="http://schemas.microsoft.com/office/powerpoint/2010/main" val="2497809585"/>
               </p:ext>
             </p:extLst>
           </p:nvPr>
@@ -20402,6 +20541,18 @@
                     <a:bodyPr/>
                     <a:lstStyle/>
                     <a:p>
+                      <a:pPr marL="0" algn="l" defTabSz="754361" rtl="0" eaLnBrk="1" latinLnBrk="0" hangingPunct="1"/>
+                      <a:r>
+                        <a:rPr lang="en-US" sz="800" kern="1200" dirty="0" smtClean="0">
+                          <a:solidFill>
+                            <a:schemeClr val="accent4"/>
+                          </a:solidFill>
+                          <a:latin typeface="+mn-lt"/>
+                          <a:ea typeface="+mn-ea"/>
+                          <a:cs typeface="+mn-cs"/>
+                        </a:rPr>
+                        <a:t>2015-01-01 </a:t>
+                      </a:r>
                       <a:r>
                         <a:rPr lang="en-US" sz="800" kern="1200" dirty="0">
                           <a:solidFill>
@@ -20411,7 +20562,7 @@
                           <a:ea typeface="+mn-ea"/>
                           <a:cs typeface="+mn-cs"/>
                         </a:rPr>
-                        <a:t>2015:01:01 10:00:00</a:t>
+                        <a:t>10:00:00</a:t>
                       </a:r>
                     </a:p>
                   </a:txBody>
@@ -20476,7 +20627,7 @@
                     <a:bodyPr/>
                     <a:lstStyle/>
                     <a:p>
-                      <a:pPr marL="0" marR="0" lvl="0" indent="0" algn="l" defTabSz="685783" rtl="0" eaLnBrk="1" fontAlgn="auto" latinLnBrk="0" hangingPunct="1">
+                      <a:pPr marL="0" marR="0" lvl="0" indent="0" algn="l" defTabSz="754361" rtl="0" eaLnBrk="1" fontAlgn="auto" latinLnBrk="0" hangingPunct="1">
                         <a:lnSpc>
                           <a:spcPct val="100000"/>
                         </a:lnSpc>
@@ -20494,6 +20645,17 @@
                         <a:defRPr/>
                       </a:pPr>
                       <a:r>
+                        <a:rPr lang="en-US" sz="800" kern="1200" dirty="0" smtClean="0">
+                          <a:solidFill>
+                            <a:schemeClr val="accent4"/>
+                          </a:solidFill>
+                          <a:latin typeface="+mn-lt"/>
+                          <a:ea typeface="+mn-ea"/>
+                          <a:cs typeface="+mn-cs"/>
+                        </a:rPr>
+                        <a:t>2015-01-01 </a:t>
+                      </a:r>
+                      <a:r>
                         <a:rPr lang="en-US" sz="800" kern="1200" dirty="0">
                           <a:solidFill>
                             <a:schemeClr val="accent4"/>
@@ -20502,7 +20664,7 @@
                           <a:ea typeface="+mn-ea"/>
                           <a:cs typeface="+mn-cs"/>
                         </a:rPr>
-                        <a:t>2015:01:01 11:00:00</a:t>
+                        <a:t>11:00:00</a:t>
                       </a:r>
                     </a:p>
                   </a:txBody>
@@ -20567,7 +20729,7 @@
                     <a:bodyPr/>
                     <a:lstStyle/>
                     <a:p>
-                      <a:pPr marL="0" marR="0" lvl="0" indent="0" algn="l" defTabSz="685783" rtl="0" eaLnBrk="1" fontAlgn="auto" latinLnBrk="0" hangingPunct="1">
+                      <a:pPr marL="0" marR="0" lvl="0" indent="0" algn="l" defTabSz="754361" rtl="0" eaLnBrk="1" fontAlgn="auto" latinLnBrk="0" hangingPunct="1">
                         <a:lnSpc>
                           <a:spcPct val="100000"/>
                         </a:lnSpc>
@@ -20585,6 +20747,17 @@
                         <a:defRPr/>
                       </a:pPr>
                       <a:r>
+                        <a:rPr lang="en-US" sz="800" kern="1200" dirty="0" smtClean="0">
+                          <a:solidFill>
+                            <a:schemeClr val="accent4"/>
+                          </a:solidFill>
+                          <a:latin typeface="+mn-lt"/>
+                          <a:ea typeface="+mn-ea"/>
+                          <a:cs typeface="+mn-cs"/>
+                        </a:rPr>
+                        <a:t>2015-01-02 </a:t>
+                      </a:r>
+                      <a:r>
                         <a:rPr lang="en-US" sz="800" kern="1200" dirty="0">
                           <a:solidFill>
                             <a:schemeClr val="accent4"/>
@@ -20593,7 +20766,7 @@
                           <a:ea typeface="+mn-ea"/>
                           <a:cs typeface="+mn-cs"/>
                         </a:rPr>
-                        <a:t>2015:01:02 10:00:00</a:t>
+                        <a:t>10:00:00</a:t>
                       </a:r>
                     </a:p>
                   </a:txBody>
@@ -20658,7 +20831,7 @@
                     <a:bodyPr/>
                     <a:lstStyle/>
                     <a:p>
-                      <a:pPr marL="0" marR="0" lvl="0" indent="0" algn="l" defTabSz="685783" rtl="0" eaLnBrk="1" fontAlgn="auto" latinLnBrk="0" hangingPunct="1">
+                      <a:pPr marL="0" marR="0" lvl="0" indent="0" algn="l" defTabSz="754361" rtl="0" eaLnBrk="1" fontAlgn="auto" latinLnBrk="0" hangingPunct="1">
                         <a:lnSpc>
                           <a:spcPct val="100000"/>
                         </a:lnSpc>
@@ -20676,6 +20849,17 @@
                         <a:defRPr/>
                       </a:pPr>
                       <a:r>
+                        <a:rPr lang="en-US" sz="800" kern="1200" dirty="0" smtClean="0">
+                          <a:solidFill>
+                            <a:schemeClr val="accent4"/>
+                          </a:solidFill>
+                          <a:latin typeface="+mn-lt"/>
+                          <a:ea typeface="+mn-ea"/>
+                          <a:cs typeface="+mn-cs"/>
+                        </a:rPr>
+                        <a:t>2015-01-02 </a:t>
+                      </a:r>
+                      <a:r>
                         <a:rPr lang="en-US" sz="800" kern="1200" dirty="0">
                           <a:solidFill>
                             <a:schemeClr val="accent4"/>
@@ -20684,7 +20868,7 @@
                           <a:ea typeface="+mn-ea"/>
                           <a:cs typeface="+mn-cs"/>
                         </a:rPr>
-                        <a:t>2015:01:02 10:00:00</a:t>
+                        <a:t>10:00:00</a:t>
                       </a:r>
                     </a:p>
                   </a:txBody>
@@ -20762,7 +20946,7 @@
           <p:nvPr>
             <p:extLst>
               <p:ext uri="{D42A27DB-BD31-4B8C-83A1-F6EECF244321}">
-                <p14:modId xmlns:p14="http://schemas.microsoft.com/office/powerpoint/2010/main" val="1066608391"/>
+                <p14:modId xmlns:p14="http://schemas.microsoft.com/office/powerpoint/2010/main" val="2017914664"/>
               </p:ext>
             </p:extLst>
           </p:nvPr>
@@ -20949,7 +21133,7 @@
                     <a:lstStyle/>
                     <a:p>
                       <a:r>
-                        <a:rPr lang="en-US" sz="800" kern="1200" dirty="0">
+                        <a:rPr lang="en-US" sz="800" kern="1200" dirty="0" smtClean="0">
                           <a:solidFill>
                             <a:schemeClr val="accent4"/>
                           </a:solidFill>
@@ -20957,8 +21141,16 @@
                           <a:ea typeface="+mn-ea"/>
                           <a:cs typeface="+mn-cs"/>
                         </a:rPr>
-                        <a:t>2015:01:01</a:t>
+                        <a:t>2015-01-01</a:t>
                       </a:r>
+                      <a:endParaRPr lang="en-US" sz="800" kern="1200" dirty="0">
+                        <a:solidFill>
+                          <a:schemeClr val="accent4"/>
+                        </a:solidFill>
+                        <a:latin typeface="+mn-lt"/>
+                        <a:ea typeface="+mn-ea"/>
+                        <a:cs typeface="+mn-cs"/>
+                      </a:endParaRPr>
                     </a:p>
                   </a:txBody>
                   <a:tcPr marL="44963" marR="44963" marT="22481" marB="22481">
@@ -21060,7 +21252,7 @@
                         <a:defRPr/>
                       </a:pPr>
                       <a:r>
-                        <a:rPr lang="en-US" sz="800" kern="1200" dirty="0">
+                        <a:rPr lang="en-US" sz="800" kern="1200" dirty="0" smtClean="0">
                           <a:solidFill>
                             <a:schemeClr val="accent4"/>
                           </a:solidFill>
@@ -21068,8 +21260,16 @@
                           <a:ea typeface="+mn-ea"/>
                           <a:cs typeface="+mn-cs"/>
                         </a:rPr>
-                        <a:t>2015:01:02</a:t>
+                        <a:t>2015-01-02</a:t>
                       </a:r>
+                      <a:endParaRPr lang="en-US" sz="800" kern="1200" dirty="0">
+                        <a:solidFill>
+                          <a:schemeClr val="accent4"/>
+                        </a:solidFill>
+                        <a:latin typeface="+mn-lt"/>
+                        <a:ea typeface="+mn-ea"/>
+                        <a:cs typeface="+mn-cs"/>
+                      </a:endParaRPr>
                     </a:p>
                   </a:txBody>
                   <a:tcPr marL="44963" marR="44963" marT="22481" marB="22481">
@@ -21115,8 +21315,27 @@
                           <a:ea typeface="+mn-ea"/>
                           <a:cs typeface="+mn-cs"/>
                         </a:rPr>
-                        <a:t>20</a:t>
+                        <a:t>1</a:t>
                       </a:r>
+                      <a:r>
+                        <a:rPr lang="en-US" sz="800" kern="1200" dirty="0" smtClean="0">
+                          <a:solidFill>
+                            <a:schemeClr val="accent4"/>
+                          </a:solidFill>
+                          <a:latin typeface="+mn-lt"/>
+                          <a:ea typeface="+mn-ea"/>
+                          <a:cs typeface="+mn-cs"/>
+                        </a:rPr>
+                        <a:t>0</a:t>
+                      </a:r>
+                      <a:endParaRPr lang="en-US" sz="800" kern="1200" dirty="0">
+                        <a:solidFill>
+                          <a:schemeClr val="accent4"/>
+                        </a:solidFill>
+                        <a:latin typeface="+mn-lt"/>
+                        <a:ea typeface="+mn-ea"/>
+                        <a:cs typeface="+mn-cs"/>
+                      </a:endParaRPr>
                     </a:p>
                   </a:txBody>
                   <a:tcPr marL="44963" marR="44963" marT="22481" marB="22481"/>
@@ -21944,17 +22163,14 @@
               <a:t> </a:t>
             </a:r>
             <a:r>
-              <a:rPr lang="en-US" sz="800" dirty="0" err="1">
-                <a:latin typeface="Consolas" panose="020B0609020204030204" pitchFamily="49" charset="0"/>
-              </a:rPr>
-              <a:t>hour_of_day</a:t>
-            </a:r>
-            <a:r>
-              <a:rPr lang="en-US" sz="800" dirty="0">
-                <a:latin typeface="Consolas" panose="020B0609020204030204" pitchFamily="49" charset="0"/>
-              </a:rPr>
-              <a:t>;</a:t>
-            </a:r>
+              <a:rPr lang="en-US" sz="800" dirty="0" smtClean="0">
+                <a:latin typeface="Consolas" panose="020B0609020204030204" pitchFamily="49" charset="0"/>
+              </a:rPr>
+              <a:t>hour;</a:t>
+            </a:r>
+            <a:endParaRPr lang="en-US" sz="800" dirty="0">
+              <a:latin typeface="Consolas" panose="020B0609020204030204" pitchFamily="49" charset="0"/>
+            </a:endParaRPr>
           </a:p>
           <a:p>
             <a:pPr>
@@ -23351,7 +23567,7 @@
           <p:nvPr>
             <p:extLst>
               <p:ext uri="{D42A27DB-BD31-4B8C-83A1-F6EECF244321}">
-                <p14:modId xmlns:p14="http://schemas.microsoft.com/office/powerpoint/2010/main" val="2798398368"/>
+                <p14:modId xmlns:p14="http://schemas.microsoft.com/office/powerpoint/2010/main" val="2945909474"/>
               </p:ext>
             </p:extLst>
           </p:nvPr>
@@ -23536,13 +23752,18 @@
                     <a:lstStyle/>
                     <a:p>
                       <a:r>
-                        <a:rPr lang="en-US" sz="800" dirty="0">
+                        <a:rPr lang="en-US" sz="800" dirty="0" smtClean="0">
                           <a:solidFill>
                             <a:schemeClr val="accent4"/>
                           </a:solidFill>
                         </a:rPr>
-                        <a:t>50.5</a:t>
+                        <a:t>0.5</a:t>
                       </a:r>
+                      <a:endParaRPr lang="en-US" sz="800" dirty="0">
+                        <a:solidFill>
+                          <a:schemeClr val="accent4"/>
+                        </a:solidFill>
+                      </a:endParaRPr>
                     </a:p>
                   </a:txBody>
                   <a:tcPr marL="44963" marR="44963" marT="22481" marB="22481">
@@ -26616,7 +26837,7 @@
           <p:nvPr>
             <p:extLst>
               <p:ext uri="{D42A27DB-BD31-4B8C-83A1-F6EECF244321}">
-                <p14:modId xmlns:p14="http://schemas.microsoft.com/office/powerpoint/2010/main" val="1327296081"/>
+                <p14:modId xmlns:p14="http://schemas.microsoft.com/office/powerpoint/2010/main" val="3429117661"/>
               </p:ext>
             </p:extLst>
           </p:nvPr>
@@ -27107,13 +27328,18 @@
                     <a:lstStyle/>
                     <a:p>
                       <a:r>
-                        <a:rPr lang="en-US" sz="800" dirty="0">
+                        <a:rPr lang="en-US" sz="800" dirty="0" smtClean="0">
                           <a:solidFill>
                             <a:schemeClr val="accent4"/>
                           </a:solidFill>
                         </a:rPr>
-                        <a:t>21.5</a:t>
+                        <a:t>25.1</a:t>
                       </a:r>
+                      <a:endParaRPr lang="en-US" sz="800" dirty="0">
+                        <a:solidFill>
+                          <a:schemeClr val="accent4"/>
+                        </a:solidFill>
+                      </a:endParaRPr>
                     </a:p>
                   </a:txBody>
                   <a:tcPr marL="44963" marR="44963" marT="22481" marB="22481"/>
@@ -27199,13 +27425,18 @@
                     <a:lstStyle/>
                     <a:p>
                       <a:r>
-                        <a:rPr lang="en-US" sz="800" dirty="0">
+                        <a:rPr lang="en-US" sz="800" dirty="0" smtClean="0">
                           <a:solidFill>
                             <a:schemeClr val="accent4"/>
                           </a:solidFill>
                         </a:rPr>
                         <a:t>0.5</a:t>
                       </a:r>
+                      <a:endParaRPr lang="en-US" sz="800" dirty="0">
+                        <a:solidFill>
+                          <a:schemeClr val="accent4"/>
+                        </a:solidFill>
+                      </a:endParaRPr>
                     </a:p>
                   </a:txBody>
                   <a:tcPr marL="44963" marR="44963" marT="22481" marB="22481">
@@ -27425,13 +27656,18 @@
                     <a:lstStyle/>
                     <a:p>
                       <a:r>
-                        <a:rPr lang="en-US" sz="800" dirty="0">
+                        <a:rPr lang="en-US" sz="800" dirty="0" smtClean="0">
                           <a:solidFill>
                             <a:schemeClr val="accent4"/>
                           </a:solidFill>
                         </a:rPr>
                         <a:t>0.5</a:t>
                       </a:r>
+                      <a:endParaRPr lang="en-US" sz="800" dirty="0">
+                        <a:solidFill>
+                          <a:schemeClr val="accent4"/>
+                        </a:solidFill>
+                      </a:endParaRPr>
                     </a:p>
                   </a:txBody>
                   <a:tcPr marL="44963" marR="44963" marT="22481" marB="22481"/>

</xml_diff>